<commit_message>
Updated readme file and added a few more notes
</commit_message>
<xml_diff>
--- a/Presentation2.pptx
+++ b/Presentation2.pptx
@@ -111,6 +111,11 @@
       </a:defRPr>
     </a:lvl9pPr>
   </p:defaultTextStyle>
+  <p:extLst>
+    <p:ext uri="{EFAFB233-063F-42B5-8137-9DF3F51BA10A}">
+      <p15:sldGuideLst xmlns:p15="http://schemas.microsoft.com/office/powerpoint/2012/main"/>
+    </p:ext>
+  </p:extLst>
 </p:presentation>
 </file>
 
@@ -3237,7 +3242,7 @@
           <a:p>
             <a:fld id="{48A87A34-81AB-432B-8DAE-1953F412C126}" type="datetimeFigureOut">
               <a:rPr lang="en-US" dirty="0"/>
-              <a:t>6/17/21</a:t>
+              <a:t>6/18/21</a:t>
             </a:fld>
             <a:endParaRPr lang="en-US" dirty="0"/>
           </a:p>
@@ -3443,7 +3448,7 @@
           <a:p>
             <a:fld id="{48A87A34-81AB-432B-8DAE-1953F412C126}" type="datetimeFigureOut">
               <a:rPr lang="en-US" dirty="0"/>
-              <a:t>6/17/21</a:t>
+              <a:t>6/18/21</a:t>
             </a:fld>
             <a:endParaRPr lang="en-US" dirty="0"/>
           </a:p>
@@ -3653,7 +3658,7 @@
           <a:p>
             <a:fld id="{48A87A34-81AB-432B-8DAE-1953F412C126}" type="datetimeFigureOut">
               <a:rPr lang="en-US" dirty="0"/>
-              <a:t>6/17/21</a:t>
+              <a:t>6/18/21</a:t>
             </a:fld>
             <a:endParaRPr lang="en-US" dirty="0"/>
           </a:p>
@@ -3849,7 +3854,7 @@
           <a:p>
             <a:fld id="{48A87A34-81AB-432B-8DAE-1953F412C126}" type="datetimeFigureOut">
               <a:rPr lang="en-US" dirty="0"/>
-              <a:t>6/17/21</a:t>
+              <a:t>6/18/21</a:t>
             </a:fld>
             <a:endParaRPr lang="en-US" dirty="0"/>
           </a:p>
@@ -4123,7 +4128,7 @@
           <a:p>
             <a:fld id="{48A87A34-81AB-432B-8DAE-1953F412C126}" type="datetimeFigureOut">
               <a:rPr lang="en-US" dirty="0"/>
-              <a:t>6/17/21</a:t>
+              <a:t>6/18/21</a:t>
             </a:fld>
             <a:endParaRPr lang="en-US" dirty="0"/>
           </a:p>
@@ -4386,7 +4391,7 @@
           <a:p>
             <a:fld id="{48A87A34-81AB-432B-8DAE-1953F412C126}" type="datetimeFigureOut">
               <a:rPr lang="en-US" dirty="0"/>
-              <a:t>6/17/21</a:t>
+              <a:t>6/18/21</a:t>
             </a:fld>
             <a:endParaRPr lang="en-US" dirty="0"/>
           </a:p>
@@ -4797,7 +4802,7 @@
           <a:p>
             <a:fld id="{48A87A34-81AB-432B-8DAE-1953F412C126}" type="datetimeFigureOut">
               <a:rPr lang="en-US" dirty="0"/>
-              <a:t>6/17/21</a:t>
+              <a:t>6/18/21</a:t>
             </a:fld>
             <a:endParaRPr lang="en-US" dirty="0"/>
           </a:p>
@@ -4941,7 +4946,7 @@
           <a:p>
             <a:fld id="{48A87A34-81AB-432B-8DAE-1953F412C126}" type="datetimeFigureOut">
               <a:rPr lang="en-US" dirty="0"/>
-              <a:t>6/17/21</a:t>
+              <a:t>6/18/21</a:t>
             </a:fld>
             <a:endParaRPr lang="en-US" dirty="0"/>
           </a:p>
@@ -5062,7 +5067,7 @@
           <a:p>
             <a:fld id="{48A87A34-81AB-432B-8DAE-1953F412C126}" type="datetimeFigureOut">
               <a:rPr lang="en-US" dirty="0"/>
-              <a:t>6/17/21</a:t>
+              <a:t>6/18/21</a:t>
             </a:fld>
             <a:endParaRPr lang="en-US" dirty="0"/>
           </a:p>
@@ -5308,7 +5313,7 @@
           <a:p>
             <a:fld id="{48A87A34-81AB-432B-8DAE-1953F412C126}" type="datetimeFigureOut">
               <a:rPr lang="en-US" dirty="0"/>
-              <a:t>6/17/21</a:t>
+              <a:t>6/18/21</a:t>
             </a:fld>
             <a:endParaRPr lang="en-US" dirty="0"/>
           </a:p>
@@ -5749,7 +5754,7 @@
             <a:fld id="{48A87A34-81AB-432B-8DAE-1953F412C126}" type="datetimeFigureOut">
               <a:rPr lang="en-US" dirty="0"/>
               <a:pPr/>
-              <a:t>6/17/21</a:t>
+              <a:t>6/18/21</a:t>
             </a:fld>
             <a:endParaRPr lang="en-US" dirty="0"/>
           </a:p>
@@ -6072,7 +6077,7 @@
             <a:fld id="{48A87A34-81AB-432B-8DAE-1953F412C126}" type="datetimeFigureOut">
               <a:rPr lang="en-US" dirty="0"/>
               <a:pPr/>
-              <a:t>6/17/21</a:t>
+              <a:t>6/18/21</a:t>
             </a:fld>
             <a:endParaRPr lang="en-US" dirty="0"/>
           </a:p>
@@ -7106,7 +7111,7 @@
         <p:spPr>
           <a:xfrm>
             <a:off x="1451580" y="2049517"/>
-            <a:ext cx="9279482" cy="4801314"/>
+            <a:ext cx="9279482" cy="4247317"/>
           </a:xfrm>
           <a:prstGeom prst="rect">
             <a:avLst/>
@@ -7166,7 +7171,7 @@
             </a:pPr>
             <a:r>
               <a:rPr lang="en-US" dirty="0"/>
-              <a:t>Add your own reviews and  or add a restaurant that you want to share to the rest of the community. ( in the process of doing it)</a:t>
+              <a:t>Add your own reviews</a:t>
             </a:r>
           </a:p>
           <a:p>
@@ -7181,7 +7186,7 @@
             </a:pPr>
             <a:r>
               <a:rPr lang="en-US" dirty="0"/>
-              <a:t>See the date and time stamp on it to make sure you are up to date on the review (working on this)</a:t>
+              <a:t>See the date and time stamp on it to make sure you are up to date on the review</a:t>
             </a:r>
           </a:p>
           <a:p>
@@ -7190,7 +7195,7 @@
             </a:pPr>
             <a:r>
               <a:rPr lang="en-US" dirty="0"/>
-              <a:t> Rate the restaurant (working on it)</a:t>
+              <a:t> Rate the restaurant </a:t>
             </a:r>
           </a:p>
           <a:p>
@@ -7707,12 +7712,35 @@
           <a:p>
             <a:pPr fontAlgn="base"/>
             <a:r>
-              <a:rPr lang="en-US"/>
-              <a:t>Discover </a:t>
-            </a:r>
-            <a:r>
               <a:rPr lang="en-US" dirty="0"/>
-              <a:t>the distance to you and the restaurants</a:t>
+              <a:t>Add more restaurants</a:t>
+            </a:r>
+          </a:p>
+          <a:p>
+            <a:pPr fontAlgn="base"/>
+            <a:r>
+              <a:rPr lang="en-US" dirty="0"/>
+              <a:t>Have more specific rating styles, </a:t>
+            </a:r>
+            <a:r>
+              <a:rPr lang="en-US" dirty="0" err="1"/>
+              <a:t>eg</a:t>
+            </a:r>
+            <a:r>
+              <a:rPr lang="en-US" dirty="0"/>
+              <a:t>: rate food, playground, ambience </a:t>
+            </a:r>
+            <a:r>
+              <a:rPr lang="en-US" dirty="0" err="1"/>
+              <a:t>etc</a:t>
+            </a:r>
+            <a:endParaRPr lang="en-US" dirty="0"/>
+          </a:p>
+          <a:p>
+            <a:pPr fontAlgn="base"/>
+            <a:r>
+              <a:rPr lang="en-US" dirty="0"/>
+              <a:t>Discover the distance to you and the restaurants</a:t>
             </a:r>
           </a:p>
           <a:p>

</xml_diff>